<commit_message>
Ablauf + 8 Ideen + Entscheidungen
</commit_message>
<xml_diff>
--- a/Projektmanagement_Übung_12_moodle.pptx
+++ b/Projektmanagement_Übung_12_moodle.pptx
@@ -5,7 +5,7 @@
     <p:sldMasterId id="2147483674" r:id="rId1"/>
   </p:sldMasterIdLst>
   <p:notesMasterIdLst>
-    <p:notesMasterId r:id="rId18"/>
+    <p:notesMasterId r:id="rId21"/>
   </p:notesMasterIdLst>
   <p:sldIdLst>
     <p:sldId id="257" r:id="rId2"/>
@@ -24,6 +24,9 @@
     <p:sldId id="1210" r:id="rId15"/>
     <p:sldId id="1211" r:id="rId16"/>
     <p:sldId id="1195" r:id="rId17"/>
+    <p:sldId id="261" r:id="rId18"/>
+    <p:sldId id="263" r:id="rId19"/>
+    <p:sldId id="265" r:id="rId20"/>
   </p:sldIdLst>
   <p:sldSz cx="12192000" cy="6858000"/>
   <p:notesSz cx="6858000" cy="9144000"/>
@@ -212,7 +215,7 @@
           <a:p>
             <a:fld id="{05B4A06B-26A8-2B43-A424-99ACEB0B5BE7}" type="datetimeFigureOut">
               <a:rPr lang="de-DE" smtClean="0"/>
-              <a:t>01.11.23</a:t>
+              <a:t>14.11.23</a:t>
             </a:fld>
             <a:endParaRPr lang="de-DE"/>
           </a:p>
@@ -370,7 +373,7 @@
           <a:p>
             <a:fld id="{B2DB09D9-9F17-DD4E-B37A-832A795A8B00}" type="slidenum">
               <a:rPr lang="de-DE" smtClean="0"/>
-              <a:t>‹Nr.›</a:t>
+              <a:t>‹#›</a:t>
             </a:fld>
             <a:endParaRPr lang="de-DE"/>
           </a:p>
@@ -1638,7 +1641,7 @@
             <a:fld id="{A5B0A250-5CC0-1746-B209-08E8B0DAE6AF}" type="datetimeFigureOut">
               <a:rPr lang="en-US" smtClean="0"/>
               <a:pPr/>
-              <a:t>11/1/23</a:t>
+              <a:t>11/14/23</a:t>
             </a:fld>
             <a:endParaRPr lang="en-US" dirty="0"/>
           </a:p>
@@ -1693,7 +1696,7 @@
             <a:fld id="{49ABCAEC-7D34-E549-A96E-FCEDAADBE4B0}" type="slidenum">
               <a:rPr lang="en-US" smtClean="0"/>
               <a:pPr/>
-              <a:t>‹Nr.›</a:t>
+              <a:t>‹#›</a:t>
             </a:fld>
             <a:endParaRPr lang="en-US" dirty="0"/>
           </a:p>
@@ -1838,7 +1841,7 @@
             <a:fld id="{A5B0A250-5CC0-1746-B209-08E8B0DAE6AF}" type="datetimeFigureOut">
               <a:rPr lang="en-US" smtClean="0"/>
               <a:pPr/>
-              <a:t>11/1/23</a:t>
+              <a:t>11/14/23</a:t>
             </a:fld>
             <a:endParaRPr lang="en-US" dirty="0"/>
           </a:p>
@@ -1893,7 +1896,7 @@
             <a:fld id="{49ABCAEC-7D34-E549-A96E-FCEDAADBE4B0}" type="slidenum">
               <a:rPr lang="en-US" smtClean="0"/>
               <a:pPr/>
-              <a:t>‹Nr.›</a:t>
+              <a:t>‹#›</a:t>
             </a:fld>
             <a:endParaRPr lang="en-US" dirty="0"/>
           </a:p>
@@ -2048,7 +2051,7 @@
             <a:fld id="{A5B0A250-5CC0-1746-B209-08E8B0DAE6AF}" type="datetimeFigureOut">
               <a:rPr lang="en-US" smtClean="0"/>
               <a:pPr/>
-              <a:t>11/1/23</a:t>
+              <a:t>11/14/23</a:t>
             </a:fld>
             <a:endParaRPr lang="en-US" dirty="0"/>
           </a:p>
@@ -2103,7 +2106,7 @@
             <a:fld id="{49ABCAEC-7D34-E549-A96E-FCEDAADBE4B0}" type="slidenum">
               <a:rPr lang="en-US" smtClean="0"/>
               <a:pPr/>
-              <a:t>‹Nr.›</a:t>
+              <a:t>‹#›</a:t>
             </a:fld>
             <a:endParaRPr lang="en-US" dirty="0"/>
           </a:p>
@@ -2248,7 +2251,7 @@
             <a:fld id="{A5B0A250-5CC0-1746-B209-08E8B0DAE6AF}" type="datetimeFigureOut">
               <a:rPr lang="en-US" smtClean="0"/>
               <a:pPr/>
-              <a:t>11/1/23</a:t>
+              <a:t>11/14/23</a:t>
             </a:fld>
             <a:endParaRPr lang="en-US" dirty="0"/>
           </a:p>
@@ -2303,7 +2306,7 @@
             <a:fld id="{49ABCAEC-7D34-E549-A96E-FCEDAADBE4B0}" type="slidenum">
               <a:rPr lang="en-US" smtClean="0"/>
               <a:pPr/>
-              <a:t>‹Nr.›</a:t>
+              <a:t>‹#›</a:t>
             </a:fld>
             <a:endParaRPr lang="en-US" dirty="0"/>
           </a:p>
@@ -2525,7 +2528,7 @@
             <a:fld id="{A5B0A250-5CC0-1746-B209-08E8B0DAE6AF}" type="datetimeFigureOut">
               <a:rPr lang="en-US" smtClean="0"/>
               <a:pPr/>
-              <a:t>11/1/23</a:t>
+              <a:t>11/14/23</a:t>
             </a:fld>
             <a:endParaRPr lang="en-US" dirty="0"/>
           </a:p>
@@ -2580,7 +2583,7 @@
             <a:fld id="{49ABCAEC-7D34-E549-A96E-FCEDAADBE4B0}" type="slidenum">
               <a:rPr lang="en-US" smtClean="0"/>
               <a:pPr/>
-              <a:t>‹Nr.›</a:t>
+              <a:t>‹#›</a:t>
             </a:fld>
             <a:endParaRPr lang="en-US" dirty="0"/>
           </a:p>
@@ -2792,7 +2795,7 @@
             <a:fld id="{A5B0A250-5CC0-1746-B209-08E8B0DAE6AF}" type="datetimeFigureOut">
               <a:rPr lang="en-US" smtClean="0"/>
               <a:pPr/>
-              <a:t>11/1/23</a:t>
+              <a:t>11/14/23</a:t>
             </a:fld>
             <a:endParaRPr lang="en-US" dirty="0"/>
           </a:p>
@@ -2847,7 +2850,7 @@
             <a:fld id="{49ABCAEC-7D34-E549-A96E-FCEDAADBE4B0}" type="slidenum">
               <a:rPr lang="en-US" smtClean="0"/>
               <a:pPr/>
-              <a:t>‹Nr.›</a:t>
+              <a:t>‹#›</a:t>
             </a:fld>
             <a:endParaRPr lang="en-US" dirty="0"/>
           </a:p>
@@ -3206,7 +3209,7 @@
             <a:fld id="{A5B0A250-5CC0-1746-B209-08E8B0DAE6AF}" type="datetimeFigureOut">
               <a:rPr lang="en-US" smtClean="0"/>
               <a:pPr/>
-              <a:t>11/1/23</a:t>
+              <a:t>11/14/23</a:t>
             </a:fld>
             <a:endParaRPr lang="en-US" dirty="0"/>
           </a:p>
@@ -3261,7 +3264,7 @@
             <a:fld id="{49ABCAEC-7D34-E549-A96E-FCEDAADBE4B0}" type="slidenum">
               <a:rPr lang="en-US" smtClean="0"/>
               <a:pPr/>
-              <a:t>‹Nr.›</a:t>
+              <a:t>‹#›</a:t>
             </a:fld>
             <a:endParaRPr lang="en-US" dirty="0"/>
           </a:p>
@@ -3349,7 +3352,7 @@
             <a:fld id="{A5B0A250-5CC0-1746-B209-08E8B0DAE6AF}" type="datetimeFigureOut">
               <a:rPr lang="en-US" smtClean="0"/>
               <a:pPr/>
-              <a:t>11/1/23</a:t>
+              <a:t>11/14/23</a:t>
             </a:fld>
             <a:endParaRPr lang="en-US" dirty="0"/>
           </a:p>
@@ -3404,7 +3407,7 @@
             <a:fld id="{49ABCAEC-7D34-E549-A96E-FCEDAADBE4B0}" type="slidenum">
               <a:rPr lang="en-US" smtClean="0"/>
               <a:pPr/>
-              <a:t>‹Nr.›</a:t>
+              <a:t>‹#›</a:t>
             </a:fld>
             <a:endParaRPr lang="en-US" dirty="0"/>
           </a:p>
@@ -3464,7 +3467,7 @@
             <a:fld id="{A5B0A250-5CC0-1746-B209-08E8B0DAE6AF}" type="datetimeFigureOut">
               <a:rPr lang="en-US" smtClean="0"/>
               <a:pPr/>
-              <a:t>11/1/23</a:t>
+              <a:t>11/14/23</a:t>
             </a:fld>
             <a:endParaRPr lang="en-US" dirty="0"/>
           </a:p>
@@ -3519,7 +3522,7 @@
             <a:fld id="{49ABCAEC-7D34-E549-A96E-FCEDAADBE4B0}" type="slidenum">
               <a:rPr lang="en-US" smtClean="0"/>
               <a:pPr/>
-              <a:t>‹Nr.›</a:t>
+              <a:t>‹#›</a:t>
             </a:fld>
             <a:endParaRPr lang="en-US" dirty="0"/>
           </a:p>
@@ -3777,7 +3780,7 @@
             <a:fld id="{A5B0A250-5CC0-1746-B209-08E8B0DAE6AF}" type="datetimeFigureOut">
               <a:rPr lang="en-US" smtClean="0"/>
               <a:pPr/>
-              <a:t>11/1/23</a:t>
+              <a:t>11/14/23</a:t>
             </a:fld>
             <a:endParaRPr lang="en-US" dirty="0"/>
           </a:p>
@@ -3832,7 +3835,7 @@
             <a:fld id="{49ABCAEC-7D34-E549-A96E-FCEDAADBE4B0}" type="slidenum">
               <a:rPr lang="en-US" smtClean="0"/>
               <a:pPr/>
-              <a:t>‹Nr.›</a:t>
+              <a:t>‹#›</a:t>
             </a:fld>
             <a:endParaRPr lang="en-US" dirty="0"/>
           </a:p>
@@ -4067,7 +4070,7 @@
             <a:fld id="{A5B0A250-5CC0-1746-B209-08E8B0DAE6AF}" type="datetimeFigureOut">
               <a:rPr lang="en-US" smtClean="0"/>
               <a:pPr/>
-              <a:t>11/1/23</a:t>
+              <a:t>11/14/23</a:t>
             </a:fld>
             <a:endParaRPr lang="en-US" dirty="0"/>
           </a:p>
@@ -4122,7 +4125,7 @@
             <a:fld id="{49ABCAEC-7D34-E549-A96E-FCEDAADBE4B0}" type="slidenum">
               <a:rPr lang="en-US" smtClean="0"/>
               <a:pPr/>
-              <a:t>‹Nr.›</a:t>
+              <a:t>‹#›</a:t>
             </a:fld>
             <a:endParaRPr lang="en-US" dirty="0"/>
           </a:p>
@@ -4310,7 +4313,7 @@
             <a:fld id="{A5B0A250-5CC0-1746-B209-08E8B0DAE6AF}" type="datetimeFigureOut">
               <a:rPr lang="en-US" smtClean="0"/>
               <a:pPr/>
-              <a:t>11/1/23</a:t>
+              <a:t>11/14/23</a:t>
             </a:fld>
             <a:endParaRPr lang="en-US" dirty="0"/>
           </a:p>
@@ -4401,7 +4404,7 @@
             <a:fld id="{49ABCAEC-7D34-E549-A96E-FCEDAADBE4B0}" type="slidenum">
               <a:rPr lang="en-US" smtClean="0"/>
               <a:pPr/>
-              <a:t>‹Nr.›</a:t>
+              <a:t>‹#›</a:t>
             </a:fld>
             <a:endParaRPr lang="en-US" dirty="0"/>
           </a:p>
@@ -6531,6 +6534,1694 @@
 </p:sld>
 </file>
 
+<file path=ppt/slides/slide17.xml><?xml version="1.0" encoding="utf-8"?>
+<p:sld xmlns:a="http://schemas.openxmlformats.org/drawingml/2006/main" xmlns:r="http://schemas.openxmlformats.org/officeDocument/2006/relationships" xmlns:p="http://schemas.openxmlformats.org/presentationml/2006/main">
+  <p:cSld>
+    <p:spTree>
+      <p:nvGrpSpPr>
+        <p:cNvPr id="1" name=""/>
+        <p:cNvGrpSpPr/>
+        <p:nvPr/>
+      </p:nvGrpSpPr>
+      <p:grpSpPr>
+        <a:xfrm>
+          <a:off x="0" y="0"/>
+          <a:ext cx="0" cy="0"/>
+          <a:chOff x="0" y="0"/>
+          <a:chExt cx="0" cy="0"/>
+        </a:xfrm>
+      </p:grpSpPr>
+      <p:sp>
+        <p:nvSpPr>
+          <p:cNvPr id="2" name="Freeform 2"/>
+          <p:cNvSpPr/>
+          <p:nvPr/>
+        </p:nvSpPr>
+        <p:spPr>
+          <a:xfrm rot="-5400000">
+            <a:off x="2667000" y="-2667000"/>
+            <a:ext cx="6858000" cy="12192000"/>
+          </a:xfrm>
+          <a:custGeom>
+            <a:avLst/>
+            <a:gdLst/>
+            <a:ahLst/>
+            <a:cxnLst/>
+            <a:rect l="l" t="t" r="r" b="b"/>
+            <a:pathLst>
+              <a:path w="10287000" h="18288000">
+                <a:moveTo>
+                  <a:pt x="10287000" y="0"/>
+                </a:moveTo>
+                <a:lnTo>
+                  <a:pt x="10287000" y="18288000"/>
+                </a:lnTo>
+                <a:lnTo>
+                  <a:pt x="0" y="18288000"/>
+                </a:lnTo>
+                <a:lnTo>
+                  <a:pt x="0" y="0"/>
+                </a:lnTo>
+                <a:lnTo>
+                  <a:pt x="10287000" y="0"/>
+                </a:lnTo>
+                <a:close/>
+              </a:path>
+            </a:pathLst>
+          </a:custGeom>
+          <a:blipFill>
+            <a:blip r:embed="rId2">
+              <a:alphaModFix amt="55000"/>
+            </a:blip>
+            <a:stretch>
+              <a:fillRect l="-71867" t="-3631" r="-74156" b="-2747"/>
+            </a:stretch>
+          </a:blipFill>
+        </p:spPr>
+        <p:txBody>
+          <a:bodyPr/>
+          <a:lstStyle/>
+          <a:p>
+            <a:endParaRPr lang="en-DE" sz="1200"/>
+          </a:p>
+        </p:txBody>
+      </p:sp>
+      <p:sp>
+        <p:nvSpPr>
+          <p:cNvPr id="3" name="Freeform 3"/>
+          <p:cNvSpPr/>
+          <p:nvPr/>
+        </p:nvSpPr>
+        <p:spPr>
+          <a:xfrm rot="-5282649">
+            <a:off x="502119" y="2568238"/>
+            <a:ext cx="5044763" cy="1721525"/>
+          </a:xfrm>
+          <a:custGeom>
+            <a:avLst/>
+            <a:gdLst/>
+            <a:ahLst/>
+            <a:cxnLst/>
+            <a:rect l="l" t="t" r="r" b="b"/>
+            <a:pathLst>
+              <a:path w="7567145" h="2582288">
+                <a:moveTo>
+                  <a:pt x="0" y="0"/>
+                </a:moveTo>
+                <a:lnTo>
+                  <a:pt x="7567144" y="0"/>
+                </a:lnTo>
+                <a:lnTo>
+                  <a:pt x="7567144" y="2582288"/>
+                </a:lnTo>
+                <a:lnTo>
+                  <a:pt x="0" y="2582288"/>
+                </a:lnTo>
+                <a:lnTo>
+                  <a:pt x="0" y="0"/>
+                </a:lnTo>
+                <a:close/>
+              </a:path>
+            </a:pathLst>
+          </a:custGeom>
+          <a:blipFill>
+            <a:blip r:embed="rId3">
+              <a:extLst>
+                <a:ext uri="{96DAC541-7B7A-43D3-8B79-37D633B846F1}">
+                  <asvg:svgBlip xmlns:asvg="http://schemas.microsoft.com/office/drawing/2016/SVG/main" r:embed="rId4"/>
+                </a:ext>
+              </a:extLst>
+            </a:blip>
+            <a:stretch>
+              <a:fillRect/>
+            </a:stretch>
+          </a:blipFill>
+          <a:ln cap="sq">
+            <a:noFill/>
+            <a:prstDash val="solid"/>
+            <a:miter/>
+          </a:ln>
+        </p:spPr>
+        <p:txBody>
+          <a:bodyPr/>
+          <a:lstStyle/>
+          <a:p>
+            <a:endParaRPr lang="en-DE" sz="1200"/>
+          </a:p>
+        </p:txBody>
+      </p:sp>
+      <p:sp>
+        <p:nvSpPr>
+          <p:cNvPr id="4" name="Freeform 4"/>
+          <p:cNvSpPr/>
+          <p:nvPr/>
+        </p:nvSpPr>
+        <p:spPr>
+          <a:xfrm>
+            <a:off x="1186821" y="1358376"/>
+            <a:ext cx="3675358" cy="4141249"/>
+          </a:xfrm>
+          <a:custGeom>
+            <a:avLst/>
+            <a:gdLst/>
+            <a:ahLst/>
+            <a:cxnLst/>
+            <a:rect l="l" t="t" r="r" b="b"/>
+            <a:pathLst>
+              <a:path w="5513037" h="6211873">
+                <a:moveTo>
+                  <a:pt x="0" y="0"/>
+                </a:moveTo>
+                <a:lnTo>
+                  <a:pt x="5513038" y="0"/>
+                </a:lnTo>
+                <a:lnTo>
+                  <a:pt x="5513038" y="6211872"/>
+                </a:lnTo>
+                <a:lnTo>
+                  <a:pt x="0" y="6211872"/>
+                </a:lnTo>
+                <a:lnTo>
+                  <a:pt x="0" y="0"/>
+                </a:lnTo>
+                <a:close/>
+              </a:path>
+            </a:pathLst>
+          </a:custGeom>
+          <a:blipFill>
+            <a:blip r:embed="rId5">
+              <a:extLst>
+                <a:ext uri="{96DAC541-7B7A-43D3-8B79-37D633B846F1}">
+                  <asvg:svgBlip xmlns:asvg="http://schemas.microsoft.com/office/drawing/2016/SVG/main" r:embed="rId6"/>
+                </a:ext>
+              </a:extLst>
+            </a:blip>
+            <a:stretch>
+              <a:fillRect/>
+            </a:stretch>
+          </a:blipFill>
+        </p:spPr>
+        <p:txBody>
+          <a:bodyPr/>
+          <a:lstStyle/>
+          <a:p>
+            <a:endParaRPr lang="en-DE" sz="1200"/>
+          </a:p>
+        </p:txBody>
+      </p:sp>
+      <p:sp>
+        <p:nvSpPr>
+          <p:cNvPr id="5" name="TextBox 5"/>
+          <p:cNvSpPr txBox="1"/>
+          <p:nvPr/>
+        </p:nvSpPr>
+        <p:spPr>
+          <a:xfrm>
+            <a:off x="5772677" y="1563812"/>
+            <a:ext cx="5232502" cy="760978"/>
+          </a:xfrm>
+          <a:prstGeom prst="rect">
+            <a:avLst/>
+          </a:prstGeom>
+        </p:spPr>
+        <p:txBody>
+          <a:bodyPr lIns="0" tIns="0" rIns="0" bIns="0" rtlCol="0" anchor="t">
+            <a:spAutoFit/>
+          </a:bodyPr>
+          <a:lstStyle/>
+          <a:p>
+            <a:pPr>
+              <a:lnSpc>
+                <a:spcPts val="5820"/>
+              </a:lnSpc>
+            </a:pPr>
+            <a:r>
+              <a:rPr lang="en-US" sz="6000" dirty="0">
+                <a:solidFill>
+                  <a:srgbClr val="000000"/>
+                </a:solidFill>
+                <a:latin typeface="DM Sans Bold"/>
+              </a:rPr>
+              <a:t>Creation process</a:t>
+            </a:r>
+          </a:p>
+        </p:txBody>
+      </p:sp>
+      <p:sp>
+        <p:nvSpPr>
+          <p:cNvPr id="6" name="TextBox 6"/>
+          <p:cNvSpPr txBox="1"/>
+          <p:nvPr/>
+        </p:nvSpPr>
+        <p:spPr>
+          <a:xfrm>
+            <a:off x="5772677" y="3205038"/>
+            <a:ext cx="5138381" cy="2299412"/>
+          </a:xfrm>
+          <a:prstGeom prst="rect">
+            <a:avLst/>
+          </a:prstGeom>
+        </p:spPr>
+        <p:txBody>
+          <a:bodyPr lIns="0" tIns="0" rIns="0" bIns="0" rtlCol="0" anchor="t">
+            <a:spAutoFit/>
+          </a:bodyPr>
+          <a:lstStyle/>
+          <a:p>
+            <a:pPr>
+              <a:lnSpc>
+                <a:spcPts val="1799"/>
+              </a:lnSpc>
+              <a:spcBef>
+                <a:spcPct val="0"/>
+              </a:spcBef>
+            </a:pPr>
+            <a:r>
+              <a:rPr lang="en-US" sz="1333" spc="79">
+                <a:solidFill>
+                  <a:srgbClr val="000000"/>
+                </a:solidFill>
+                <a:latin typeface="DM Sans"/>
+              </a:rPr>
+              <a:t>Lorem ipsum dolor sit amet, consectetur adipiscing elit, sed do eiusmod tempor incididunt ut labore et dolore magna aliqua. Ut enim ad minim veniam, quis nostrud exercitation ullamco laboris nisi ut aliquip ex ea commodo consequat.</a:t>
+            </a:r>
+          </a:p>
+          <a:p>
+            <a:pPr>
+              <a:lnSpc>
+                <a:spcPts val="1799"/>
+              </a:lnSpc>
+              <a:spcBef>
+                <a:spcPct val="0"/>
+              </a:spcBef>
+            </a:pPr>
+            <a:endParaRPr lang="en-US" sz="1333" spc="79">
+              <a:solidFill>
+                <a:srgbClr val="000000"/>
+              </a:solidFill>
+              <a:latin typeface="DM Sans"/>
+            </a:endParaRPr>
+          </a:p>
+          <a:p>
+            <a:pPr>
+              <a:lnSpc>
+                <a:spcPts val="1799"/>
+              </a:lnSpc>
+              <a:spcBef>
+                <a:spcPct val="0"/>
+              </a:spcBef>
+            </a:pPr>
+            <a:r>
+              <a:rPr lang="en-US" sz="1333" spc="79">
+                <a:solidFill>
+                  <a:srgbClr val="000000"/>
+                </a:solidFill>
+                <a:latin typeface="DM Sans"/>
+              </a:rPr>
+              <a:t>Duis aute irure dolor in reprehenderit in voluptate velit esse cillum dolore eu fugiat nulla pariatur. Excepteur sint occaecat cupidatat non proident, sunt in culpa qui officia deserunt mollit anim id est laborum.</a:t>
+            </a:r>
+          </a:p>
+        </p:txBody>
+      </p:sp>
+    </p:spTree>
+  </p:cSld>
+  <p:clrMapOvr>
+    <a:masterClrMapping/>
+  </p:clrMapOvr>
+</p:sld>
+</file>
+
+<file path=ppt/slides/slide18.xml><?xml version="1.0" encoding="utf-8"?>
+<p:sld xmlns:a="http://schemas.openxmlformats.org/drawingml/2006/main" xmlns:r="http://schemas.openxmlformats.org/officeDocument/2006/relationships" xmlns:p="http://schemas.openxmlformats.org/presentationml/2006/main">
+  <p:cSld>
+    <p:spTree>
+      <p:nvGrpSpPr>
+        <p:cNvPr id="1" name=""/>
+        <p:cNvGrpSpPr/>
+        <p:nvPr/>
+      </p:nvGrpSpPr>
+      <p:grpSpPr>
+        <a:xfrm>
+          <a:off x="0" y="0"/>
+          <a:ext cx="0" cy="0"/>
+          <a:chOff x="0" y="0"/>
+          <a:chExt cx="0" cy="0"/>
+        </a:xfrm>
+      </p:grpSpPr>
+      <p:sp>
+        <p:nvSpPr>
+          <p:cNvPr id="2" name="Freeform 2"/>
+          <p:cNvSpPr/>
+          <p:nvPr/>
+        </p:nvSpPr>
+        <p:spPr>
+          <a:xfrm rot="-5400000">
+            <a:off x="2667000" y="-2667000"/>
+            <a:ext cx="6858000" cy="12192000"/>
+          </a:xfrm>
+          <a:custGeom>
+            <a:avLst/>
+            <a:gdLst/>
+            <a:ahLst/>
+            <a:cxnLst/>
+            <a:rect l="l" t="t" r="r" b="b"/>
+            <a:pathLst>
+              <a:path w="10287000" h="18288000">
+                <a:moveTo>
+                  <a:pt x="10287000" y="0"/>
+                </a:moveTo>
+                <a:lnTo>
+                  <a:pt x="10287000" y="18288000"/>
+                </a:lnTo>
+                <a:lnTo>
+                  <a:pt x="0" y="18288000"/>
+                </a:lnTo>
+                <a:lnTo>
+                  <a:pt x="0" y="0"/>
+                </a:lnTo>
+                <a:lnTo>
+                  <a:pt x="10287000" y="0"/>
+                </a:lnTo>
+                <a:close/>
+              </a:path>
+            </a:pathLst>
+          </a:custGeom>
+          <a:blipFill>
+            <a:blip r:embed="rId2">
+              <a:alphaModFix amt="55000"/>
+            </a:blip>
+            <a:stretch>
+              <a:fillRect l="-71867" t="-3631" r="-74156" b="-2747"/>
+            </a:stretch>
+          </a:blipFill>
+        </p:spPr>
+        <p:txBody>
+          <a:bodyPr/>
+          <a:lstStyle/>
+          <a:p>
+            <a:endParaRPr lang="en-DE" sz="1200"/>
+          </a:p>
+        </p:txBody>
+      </p:sp>
+      <p:sp>
+        <p:nvSpPr>
+          <p:cNvPr id="3" name="TextBox 3"/>
+          <p:cNvSpPr txBox="1"/>
+          <p:nvPr/>
+        </p:nvSpPr>
+        <p:spPr>
+          <a:xfrm>
+            <a:off x="2757700" y="2916856"/>
+            <a:ext cx="6676601" cy="590803"/>
+          </a:xfrm>
+          <a:prstGeom prst="rect">
+            <a:avLst/>
+          </a:prstGeom>
+        </p:spPr>
+        <p:txBody>
+          <a:bodyPr lIns="0" tIns="0" rIns="0" bIns="0" rtlCol="0" anchor="t">
+            <a:spAutoFit/>
+          </a:bodyPr>
+          <a:lstStyle/>
+          <a:p>
+            <a:pPr algn="ctr">
+              <a:lnSpc>
+                <a:spcPts val="4526"/>
+              </a:lnSpc>
+            </a:pPr>
+            <a:r>
+              <a:rPr lang="en-US" sz="4666">
+                <a:solidFill>
+                  <a:srgbClr val="000000"/>
+                </a:solidFill>
+                <a:latin typeface="DM Sans Bold"/>
+              </a:rPr>
+              <a:t>Success cases</a:t>
+            </a:r>
+          </a:p>
+        </p:txBody>
+      </p:sp>
+      <p:sp>
+        <p:nvSpPr>
+          <p:cNvPr id="4" name="TextBox 4"/>
+          <p:cNvSpPr txBox="1"/>
+          <p:nvPr/>
+        </p:nvSpPr>
+        <p:spPr>
+          <a:xfrm>
+            <a:off x="2814652" y="3713361"/>
+            <a:ext cx="6562697" cy="1837747"/>
+          </a:xfrm>
+          <a:prstGeom prst="rect">
+            <a:avLst/>
+          </a:prstGeom>
+        </p:spPr>
+        <p:txBody>
+          <a:bodyPr lIns="0" tIns="0" rIns="0" bIns="0" rtlCol="0" anchor="t">
+            <a:spAutoFit/>
+          </a:bodyPr>
+          <a:lstStyle/>
+          <a:p>
+            <a:pPr algn="ctr">
+              <a:lnSpc>
+                <a:spcPts val="1799"/>
+              </a:lnSpc>
+              <a:spcBef>
+                <a:spcPct val="0"/>
+              </a:spcBef>
+            </a:pPr>
+            <a:r>
+              <a:rPr lang="en-US" sz="1333" spc="79">
+                <a:solidFill>
+                  <a:srgbClr val="000000"/>
+                </a:solidFill>
+                <a:latin typeface="DM Sans"/>
+              </a:rPr>
+              <a:t>Lorem ipsum dolor sit amet, consectetur adipiscing elit, sed do eiusmod tempor incididunt ut labore et dolore magna aliqua. Ut enim ad minim veniam, quis nostrud exercitation ullamco laboris nisi ut aliquip ex ea commodo consequat.</a:t>
+            </a:r>
+          </a:p>
+          <a:p>
+            <a:pPr algn="ctr">
+              <a:lnSpc>
+                <a:spcPts val="1799"/>
+              </a:lnSpc>
+              <a:spcBef>
+                <a:spcPct val="0"/>
+              </a:spcBef>
+            </a:pPr>
+            <a:endParaRPr lang="en-US" sz="1333" spc="79">
+              <a:solidFill>
+                <a:srgbClr val="000000"/>
+              </a:solidFill>
+              <a:latin typeface="DM Sans"/>
+            </a:endParaRPr>
+          </a:p>
+          <a:p>
+            <a:pPr algn="ctr">
+              <a:lnSpc>
+                <a:spcPts val="1799"/>
+              </a:lnSpc>
+              <a:spcBef>
+                <a:spcPct val="0"/>
+              </a:spcBef>
+            </a:pPr>
+            <a:r>
+              <a:rPr lang="en-US" sz="1333" spc="79">
+                <a:solidFill>
+                  <a:srgbClr val="000000"/>
+                </a:solidFill>
+                <a:latin typeface="DM Sans"/>
+              </a:rPr>
+              <a:t>Duis aute irure dolor in reprehenderit in voluptate velit esse cillum dolore eu fugiat nulla pariatur. Excepteur sint occaecat cupidatat non proident, sunt in culpa qui officia deserunt mollit anim id est laborum.</a:t>
+            </a:r>
+          </a:p>
+        </p:txBody>
+      </p:sp>
+      <p:sp>
+        <p:nvSpPr>
+          <p:cNvPr id="5" name="TextBox 5"/>
+          <p:cNvSpPr txBox="1"/>
+          <p:nvPr/>
+        </p:nvSpPr>
+        <p:spPr>
+          <a:xfrm>
+            <a:off x="3657645" y="1265039"/>
+            <a:ext cx="4876711" cy="1652825"/>
+          </a:xfrm>
+          <a:prstGeom prst="rect">
+            <a:avLst/>
+          </a:prstGeom>
+        </p:spPr>
+        <p:txBody>
+          <a:bodyPr lIns="0" tIns="0" rIns="0" bIns="0" rtlCol="0" anchor="t">
+            <a:spAutoFit/>
+          </a:bodyPr>
+          <a:lstStyle/>
+          <a:p>
+            <a:pPr algn="ctr">
+              <a:lnSpc>
+                <a:spcPts val="12635"/>
+              </a:lnSpc>
+            </a:pPr>
+            <a:r>
+              <a:rPr lang="en-US" sz="13026">
+                <a:solidFill>
+                  <a:srgbClr val="000000"/>
+                </a:solidFill>
+                <a:latin typeface="DM Sans Bold"/>
+              </a:rPr>
+              <a:t>95%</a:t>
+            </a:r>
+          </a:p>
+        </p:txBody>
+      </p:sp>
+      <p:sp>
+        <p:nvSpPr>
+          <p:cNvPr id="6" name="Freeform 6"/>
+          <p:cNvSpPr/>
+          <p:nvPr/>
+        </p:nvSpPr>
+        <p:spPr>
+          <a:xfrm>
+            <a:off x="-1552932" y="6011989"/>
+            <a:ext cx="3266632" cy="2229476"/>
+          </a:xfrm>
+          <a:custGeom>
+            <a:avLst/>
+            <a:gdLst/>
+            <a:ahLst/>
+            <a:cxnLst/>
+            <a:rect l="l" t="t" r="r" b="b"/>
+            <a:pathLst>
+              <a:path w="4899948" h="3344214">
+                <a:moveTo>
+                  <a:pt x="0" y="0"/>
+                </a:moveTo>
+                <a:lnTo>
+                  <a:pt x="4899947" y="0"/>
+                </a:lnTo>
+                <a:lnTo>
+                  <a:pt x="4899947" y="3344214"/>
+                </a:lnTo>
+                <a:lnTo>
+                  <a:pt x="0" y="3344214"/>
+                </a:lnTo>
+                <a:lnTo>
+                  <a:pt x="0" y="0"/>
+                </a:lnTo>
+                <a:close/>
+              </a:path>
+            </a:pathLst>
+          </a:custGeom>
+          <a:blipFill>
+            <a:blip r:embed="rId3">
+              <a:extLst>
+                <a:ext uri="{96DAC541-7B7A-43D3-8B79-37D633B846F1}">
+                  <asvg:svgBlip xmlns:asvg="http://schemas.microsoft.com/office/drawing/2016/SVG/main" r:embed="rId4"/>
+                </a:ext>
+              </a:extLst>
+            </a:blip>
+            <a:stretch>
+              <a:fillRect/>
+            </a:stretch>
+          </a:blipFill>
+        </p:spPr>
+        <p:txBody>
+          <a:bodyPr/>
+          <a:lstStyle/>
+          <a:p>
+            <a:endParaRPr lang="en-DE" sz="1200"/>
+          </a:p>
+        </p:txBody>
+      </p:sp>
+      <p:sp>
+        <p:nvSpPr>
+          <p:cNvPr id="7" name="Freeform 7"/>
+          <p:cNvSpPr/>
+          <p:nvPr/>
+        </p:nvSpPr>
+        <p:spPr>
+          <a:xfrm>
+            <a:off x="3898029" y="6588250"/>
+            <a:ext cx="2197971" cy="539502"/>
+          </a:xfrm>
+          <a:custGeom>
+            <a:avLst/>
+            <a:gdLst/>
+            <a:ahLst/>
+            <a:cxnLst/>
+            <a:rect l="l" t="t" r="r" b="b"/>
+            <a:pathLst>
+              <a:path w="3296956" h="809253">
+                <a:moveTo>
+                  <a:pt x="0" y="0"/>
+                </a:moveTo>
+                <a:lnTo>
+                  <a:pt x="3296956" y="0"/>
+                </a:lnTo>
+                <a:lnTo>
+                  <a:pt x="3296956" y="809252"/>
+                </a:lnTo>
+                <a:lnTo>
+                  <a:pt x="0" y="809252"/>
+                </a:lnTo>
+                <a:lnTo>
+                  <a:pt x="0" y="0"/>
+                </a:lnTo>
+                <a:close/>
+              </a:path>
+            </a:pathLst>
+          </a:custGeom>
+          <a:blipFill>
+            <a:blip r:embed="rId5">
+              <a:extLst>
+                <a:ext uri="{96DAC541-7B7A-43D3-8B79-37D633B846F1}">
+                  <asvg:svgBlip xmlns:asvg="http://schemas.microsoft.com/office/drawing/2016/SVG/main" r:embed="rId6"/>
+                </a:ext>
+              </a:extLst>
+            </a:blip>
+            <a:stretch>
+              <a:fillRect/>
+            </a:stretch>
+          </a:blipFill>
+        </p:spPr>
+        <p:txBody>
+          <a:bodyPr/>
+          <a:lstStyle/>
+          <a:p>
+            <a:endParaRPr lang="en-DE" sz="1200"/>
+          </a:p>
+        </p:txBody>
+      </p:sp>
+      <p:sp>
+        <p:nvSpPr>
+          <p:cNvPr id="8" name="Freeform 8"/>
+          <p:cNvSpPr/>
+          <p:nvPr/>
+        </p:nvSpPr>
+        <p:spPr>
+          <a:xfrm>
+            <a:off x="9663182" y="6011989"/>
+            <a:ext cx="2951895" cy="2320928"/>
+          </a:xfrm>
+          <a:custGeom>
+            <a:avLst/>
+            <a:gdLst/>
+            <a:ahLst/>
+            <a:cxnLst/>
+            <a:rect l="l" t="t" r="r" b="b"/>
+            <a:pathLst>
+              <a:path w="4427843" h="3481392">
+                <a:moveTo>
+                  <a:pt x="0" y="0"/>
+                </a:moveTo>
+                <a:lnTo>
+                  <a:pt x="4427843" y="0"/>
+                </a:lnTo>
+                <a:lnTo>
+                  <a:pt x="4427843" y="3481391"/>
+                </a:lnTo>
+                <a:lnTo>
+                  <a:pt x="0" y="3481391"/>
+                </a:lnTo>
+                <a:lnTo>
+                  <a:pt x="0" y="0"/>
+                </a:lnTo>
+                <a:close/>
+              </a:path>
+            </a:pathLst>
+          </a:custGeom>
+          <a:blipFill>
+            <a:blip r:embed="rId7">
+              <a:extLst>
+                <a:ext uri="{96DAC541-7B7A-43D3-8B79-37D633B846F1}">
+                  <asvg:svgBlip xmlns:asvg="http://schemas.microsoft.com/office/drawing/2016/SVG/main" r:embed="rId8"/>
+                </a:ext>
+              </a:extLst>
+            </a:blip>
+            <a:stretch>
+              <a:fillRect/>
+            </a:stretch>
+          </a:blipFill>
+          <a:ln cap="sq">
+            <a:noFill/>
+            <a:prstDash val="solid"/>
+            <a:miter/>
+          </a:ln>
+        </p:spPr>
+        <p:txBody>
+          <a:bodyPr/>
+          <a:lstStyle/>
+          <a:p>
+            <a:endParaRPr lang="en-DE" sz="1200"/>
+          </a:p>
+        </p:txBody>
+      </p:sp>
+      <p:sp>
+        <p:nvSpPr>
+          <p:cNvPr id="9" name="Freeform 9"/>
+          <p:cNvSpPr/>
+          <p:nvPr/>
+        </p:nvSpPr>
+        <p:spPr>
+          <a:xfrm>
+            <a:off x="-508932" y="-1022864"/>
+            <a:ext cx="3266632" cy="2045728"/>
+          </a:xfrm>
+          <a:custGeom>
+            <a:avLst/>
+            <a:gdLst/>
+            <a:ahLst/>
+            <a:cxnLst/>
+            <a:rect l="l" t="t" r="r" b="b"/>
+            <a:pathLst>
+              <a:path w="4899948" h="3068592">
+                <a:moveTo>
+                  <a:pt x="0" y="0"/>
+                </a:moveTo>
+                <a:lnTo>
+                  <a:pt x="4899947" y="0"/>
+                </a:lnTo>
+                <a:lnTo>
+                  <a:pt x="4899947" y="3068592"/>
+                </a:lnTo>
+                <a:lnTo>
+                  <a:pt x="0" y="3068592"/>
+                </a:lnTo>
+                <a:lnTo>
+                  <a:pt x="0" y="0"/>
+                </a:lnTo>
+                <a:close/>
+              </a:path>
+            </a:pathLst>
+          </a:custGeom>
+          <a:blipFill>
+            <a:blip r:embed="rId9">
+              <a:extLst>
+                <a:ext uri="{96DAC541-7B7A-43D3-8B79-37D633B846F1}">
+                  <asvg:svgBlip xmlns:asvg="http://schemas.microsoft.com/office/drawing/2016/SVG/main" r:embed="rId10"/>
+                </a:ext>
+              </a:extLst>
+            </a:blip>
+            <a:stretch>
+              <a:fillRect/>
+            </a:stretch>
+          </a:blipFill>
+          <a:ln cap="sq">
+            <a:noFill/>
+            <a:prstDash val="solid"/>
+            <a:miter/>
+          </a:ln>
+        </p:spPr>
+        <p:txBody>
+          <a:bodyPr/>
+          <a:lstStyle/>
+          <a:p>
+            <a:endParaRPr lang="en-DE" sz="1200"/>
+          </a:p>
+        </p:txBody>
+      </p:sp>
+      <p:sp>
+        <p:nvSpPr>
+          <p:cNvPr id="10" name="Freeform 10"/>
+          <p:cNvSpPr/>
+          <p:nvPr/>
+        </p:nvSpPr>
+        <p:spPr>
+          <a:xfrm>
+            <a:off x="8534355" y="-2035986"/>
+            <a:ext cx="2861616" cy="2580657"/>
+          </a:xfrm>
+          <a:custGeom>
+            <a:avLst/>
+            <a:gdLst/>
+            <a:ahLst/>
+            <a:cxnLst/>
+            <a:rect l="l" t="t" r="r" b="b"/>
+            <a:pathLst>
+              <a:path w="4292424" h="3870986">
+                <a:moveTo>
+                  <a:pt x="0" y="0"/>
+                </a:moveTo>
+                <a:lnTo>
+                  <a:pt x="4292424" y="0"/>
+                </a:lnTo>
+                <a:lnTo>
+                  <a:pt x="4292424" y="3870986"/>
+                </a:lnTo>
+                <a:lnTo>
+                  <a:pt x="0" y="3870986"/>
+                </a:lnTo>
+                <a:lnTo>
+                  <a:pt x="0" y="0"/>
+                </a:lnTo>
+                <a:close/>
+              </a:path>
+            </a:pathLst>
+          </a:custGeom>
+          <a:blipFill>
+            <a:blip r:embed="rId11">
+              <a:extLst>
+                <a:ext uri="{96DAC541-7B7A-43D3-8B79-37D633B846F1}">
+                  <asvg:svgBlip xmlns:asvg="http://schemas.microsoft.com/office/drawing/2016/SVG/main" r:embed="rId12"/>
+                </a:ext>
+              </a:extLst>
+            </a:blip>
+            <a:stretch>
+              <a:fillRect/>
+            </a:stretch>
+          </a:blipFill>
+          <a:ln cap="sq">
+            <a:noFill/>
+            <a:prstDash val="solid"/>
+            <a:miter/>
+          </a:ln>
+        </p:spPr>
+        <p:txBody>
+          <a:bodyPr/>
+          <a:lstStyle/>
+          <a:p>
+            <a:endParaRPr lang="en-DE" sz="1200"/>
+          </a:p>
+        </p:txBody>
+      </p:sp>
+      <p:sp>
+        <p:nvSpPr>
+          <p:cNvPr id="11" name="Freeform 11"/>
+          <p:cNvSpPr/>
+          <p:nvPr/>
+        </p:nvSpPr>
+        <p:spPr>
+          <a:xfrm>
+            <a:off x="6759290" y="6172200"/>
+            <a:ext cx="2717513" cy="1909053"/>
+          </a:xfrm>
+          <a:custGeom>
+            <a:avLst/>
+            <a:gdLst/>
+            <a:ahLst/>
+            <a:cxnLst/>
+            <a:rect l="l" t="t" r="r" b="b"/>
+            <a:pathLst>
+              <a:path w="4076270" h="2863579">
+                <a:moveTo>
+                  <a:pt x="0" y="0"/>
+                </a:moveTo>
+                <a:lnTo>
+                  <a:pt x="4076270" y="0"/>
+                </a:lnTo>
+                <a:lnTo>
+                  <a:pt x="4076270" y="2863579"/>
+                </a:lnTo>
+                <a:lnTo>
+                  <a:pt x="0" y="2863579"/>
+                </a:lnTo>
+                <a:lnTo>
+                  <a:pt x="0" y="0"/>
+                </a:lnTo>
+                <a:close/>
+              </a:path>
+            </a:pathLst>
+          </a:custGeom>
+          <a:blipFill>
+            <a:blip r:embed="rId13">
+              <a:extLst>
+                <a:ext uri="{96DAC541-7B7A-43D3-8B79-37D633B846F1}">
+                  <asvg:svgBlip xmlns:asvg="http://schemas.microsoft.com/office/drawing/2016/SVG/main" r:embed="rId14"/>
+                </a:ext>
+              </a:extLst>
+            </a:blip>
+            <a:stretch>
+              <a:fillRect/>
+            </a:stretch>
+          </a:blipFill>
+          <a:ln cap="sq">
+            <a:noFill/>
+            <a:prstDash val="solid"/>
+            <a:miter/>
+          </a:ln>
+        </p:spPr>
+        <p:txBody>
+          <a:bodyPr/>
+          <a:lstStyle/>
+          <a:p>
+            <a:endParaRPr lang="en-DE" sz="1200"/>
+          </a:p>
+        </p:txBody>
+      </p:sp>
+      <p:sp>
+        <p:nvSpPr>
+          <p:cNvPr id="12" name="Freeform 12"/>
+          <p:cNvSpPr/>
+          <p:nvPr/>
+        </p:nvSpPr>
+        <p:spPr>
+          <a:xfrm>
+            <a:off x="4997015" y="-2198529"/>
+            <a:ext cx="3662039" cy="2743200"/>
+          </a:xfrm>
+          <a:custGeom>
+            <a:avLst/>
+            <a:gdLst/>
+            <a:ahLst/>
+            <a:cxnLst/>
+            <a:rect l="l" t="t" r="r" b="b"/>
+            <a:pathLst>
+              <a:path w="5493058" h="4114800">
+                <a:moveTo>
+                  <a:pt x="0" y="0"/>
+                </a:moveTo>
+                <a:lnTo>
+                  <a:pt x="5493058" y="0"/>
+                </a:lnTo>
+                <a:lnTo>
+                  <a:pt x="5493058" y="4114800"/>
+                </a:lnTo>
+                <a:lnTo>
+                  <a:pt x="0" y="4114800"/>
+                </a:lnTo>
+                <a:lnTo>
+                  <a:pt x="0" y="0"/>
+                </a:lnTo>
+                <a:close/>
+              </a:path>
+            </a:pathLst>
+          </a:custGeom>
+          <a:blipFill>
+            <a:blip r:embed="rId15">
+              <a:extLst>
+                <a:ext uri="{96DAC541-7B7A-43D3-8B79-37D633B846F1}">
+                  <asvg:svgBlip xmlns:asvg="http://schemas.microsoft.com/office/drawing/2016/SVG/main" r:embed="rId16"/>
+                </a:ext>
+              </a:extLst>
+            </a:blip>
+            <a:stretch>
+              <a:fillRect/>
+            </a:stretch>
+          </a:blipFill>
+          <a:ln cap="sq">
+            <a:noFill/>
+            <a:prstDash val="solid"/>
+            <a:miter/>
+          </a:ln>
+        </p:spPr>
+        <p:txBody>
+          <a:bodyPr/>
+          <a:lstStyle/>
+          <a:p>
+            <a:endParaRPr lang="en-DE" sz="1200"/>
+          </a:p>
+        </p:txBody>
+      </p:sp>
+      <p:sp>
+        <p:nvSpPr>
+          <p:cNvPr id="13" name="Freeform 13"/>
+          <p:cNvSpPr/>
+          <p:nvPr/>
+        </p:nvSpPr>
+        <p:spPr>
+          <a:xfrm rot="4747568">
+            <a:off x="-1981561" y="2443545"/>
+            <a:ext cx="3264065" cy="1823796"/>
+          </a:xfrm>
+          <a:custGeom>
+            <a:avLst/>
+            <a:gdLst/>
+            <a:ahLst/>
+            <a:cxnLst/>
+            <a:rect l="l" t="t" r="r" b="b"/>
+            <a:pathLst>
+              <a:path w="4896097" h="2735694">
+                <a:moveTo>
+                  <a:pt x="0" y="0"/>
+                </a:moveTo>
+                <a:lnTo>
+                  <a:pt x="4896097" y="0"/>
+                </a:lnTo>
+                <a:lnTo>
+                  <a:pt x="4896097" y="2735694"/>
+                </a:lnTo>
+                <a:lnTo>
+                  <a:pt x="0" y="2735694"/>
+                </a:lnTo>
+                <a:lnTo>
+                  <a:pt x="0" y="0"/>
+                </a:lnTo>
+                <a:close/>
+              </a:path>
+            </a:pathLst>
+          </a:custGeom>
+          <a:blipFill>
+            <a:blip r:embed="rId17">
+              <a:extLst>
+                <a:ext uri="{96DAC541-7B7A-43D3-8B79-37D633B846F1}">
+                  <asvg:svgBlip xmlns:asvg="http://schemas.microsoft.com/office/drawing/2016/SVG/main" r:embed="rId18"/>
+                </a:ext>
+              </a:extLst>
+            </a:blip>
+            <a:stretch>
+              <a:fillRect/>
+            </a:stretch>
+          </a:blipFill>
+          <a:ln cap="sq">
+            <a:noFill/>
+            <a:prstDash val="solid"/>
+            <a:miter/>
+          </a:ln>
+        </p:spPr>
+        <p:txBody>
+          <a:bodyPr/>
+          <a:lstStyle/>
+          <a:p>
+            <a:endParaRPr lang="en-DE" sz="1200"/>
+          </a:p>
+        </p:txBody>
+      </p:sp>
+      <p:sp>
+        <p:nvSpPr>
+          <p:cNvPr id="14" name="Freeform 14"/>
+          <p:cNvSpPr/>
+          <p:nvPr/>
+        </p:nvSpPr>
+        <p:spPr>
+          <a:xfrm>
+            <a:off x="3240769" y="-1401529"/>
+            <a:ext cx="1928508" cy="1946201"/>
+          </a:xfrm>
+          <a:custGeom>
+            <a:avLst/>
+            <a:gdLst/>
+            <a:ahLst/>
+            <a:cxnLst/>
+            <a:rect l="l" t="t" r="r" b="b"/>
+            <a:pathLst>
+              <a:path w="2892762" h="2919301">
+                <a:moveTo>
+                  <a:pt x="0" y="0"/>
+                </a:moveTo>
+                <a:lnTo>
+                  <a:pt x="2892761" y="0"/>
+                </a:lnTo>
+                <a:lnTo>
+                  <a:pt x="2892761" y="2919300"/>
+                </a:lnTo>
+                <a:lnTo>
+                  <a:pt x="0" y="2919300"/>
+                </a:lnTo>
+                <a:lnTo>
+                  <a:pt x="0" y="0"/>
+                </a:lnTo>
+                <a:close/>
+              </a:path>
+            </a:pathLst>
+          </a:custGeom>
+          <a:blipFill>
+            <a:blip r:embed="rId19">
+              <a:extLst>
+                <a:ext uri="{96DAC541-7B7A-43D3-8B79-37D633B846F1}">
+                  <asvg:svgBlip xmlns:asvg="http://schemas.microsoft.com/office/drawing/2016/SVG/main" r:embed="rId20"/>
+                </a:ext>
+              </a:extLst>
+            </a:blip>
+            <a:stretch>
+              <a:fillRect/>
+            </a:stretch>
+          </a:blipFill>
+          <a:ln cap="sq">
+            <a:noFill/>
+            <a:prstDash val="solid"/>
+            <a:miter/>
+          </a:ln>
+        </p:spPr>
+        <p:txBody>
+          <a:bodyPr/>
+          <a:lstStyle/>
+          <a:p>
+            <a:endParaRPr lang="en-DE" sz="1200"/>
+          </a:p>
+        </p:txBody>
+      </p:sp>
+      <p:sp>
+        <p:nvSpPr>
+          <p:cNvPr id="15" name="Freeform 15"/>
+          <p:cNvSpPr/>
+          <p:nvPr/>
+        </p:nvSpPr>
+        <p:spPr>
+          <a:xfrm>
+            <a:off x="11663207" y="1580687"/>
+            <a:ext cx="2383694" cy="2383694"/>
+          </a:xfrm>
+          <a:custGeom>
+            <a:avLst/>
+            <a:gdLst/>
+            <a:ahLst/>
+            <a:cxnLst/>
+            <a:rect l="l" t="t" r="r" b="b"/>
+            <a:pathLst>
+              <a:path w="3575541" h="3575541">
+                <a:moveTo>
+                  <a:pt x="0" y="0"/>
+                </a:moveTo>
+                <a:lnTo>
+                  <a:pt x="3575541" y="0"/>
+                </a:lnTo>
+                <a:lnTo>
+                  <a:pt x="3575541" y="3575541"/>
+                </a:lnTo>
+                <a:lnTo>
+                  <a:pt x="0" y="3575541"/>
+                </a:lnTo>
+                <a:lnTo>
+                  <a:pt x="0" y="0"/>
+                </a:lnTo>
+                <a:close/>
+              </a:path>
+            </a:pathLst>
+          </a:custGeom>
+          <a:blipFill>
+            <a:blip r:embed="rId21">
+              <a:extLst>
+                <a:ext uri="{96DAC541-7B7A-43D3-8B79-37D633B846F1}">
+                  <asvg:svgBlip xmlns:asvg="http://schemas.microsoft.com/office/drawing/2016/SVG/main" r:embed="rId22"/>
+                </a:ext>
+              </a:extLst>
+            </a:blip>
+            <a:stretch>
+              <a:fillRect/>
+            </a:stretch>
+          </a:blipFill>
+          <a:ln cap="sq">
+            <a:noFill/>
+            <a:prstDash val="solid"/>
+            <a:miter/>
+          </a:ln>
+        </p:spPr>
+        <p:txBody>
+          <a:bodyPr/>
+          <a:lstStyle/>
+          <a:p>
+            <a:endParaRPr lang="en-DE" sz="1200"/>
+          </a:p>
+        </p:txBody>
+      </p:sp>
+      <p:sp>
+        <p:nvSpPr>
+          <p:cNvPr id="16" name="Freeform 16"/>
+          <p:cNvSpPr/>
+          <p:nvPr/>
+        </p:nvSpPr>
+        <p:spPr>
+          <a:xfrm>
+            <a:off x="1713699" y="6331218"/>
+            <a:ext cx="1724680" cy="1591017"/>
+          </a:xfrm>
+          <a:custGeom>
+            <a:avLst/>
+            <a:gdLst/>
+            <a:ahLst/>
+            <a:cxnLst/>
+            <a:rect l="l" t="t" r="r" b="b"/>
+            <a:pathLst>
+              <a:path w="2587020" h="2386526">
+                <a:moveTo>
+                  <a:pt x="0" y="0"/>
+                </a:moveTo>
+                <a:lnTo>
+                  <a:pt x="2587020" y="0"/>
+                </a:lnTo>
+                <a:lnTo>
+                  <a:pt x="2587020" y="2386526"/>
+                </a:lnTo>
+                <a:lnTo>
+                  <a:pt x="0" y="2386526"/>
+                </a:lnTo>
+                <a:lnTo>
+                  <a:pt x="0" y="0"/>
+                </a:lnTo>
+                <a:close/>
+              </a:path>
+            </a:pathLst>
+          </a:custGeom>
+          <a:blipFill>
+            <a:blip r:embed="rId23">
+              <a:extLst>
+                <a:ext uri="{96DAC541-7B7A-43D3-8B79-37D633B846F1}">
+                  <asvg:svgBlip xmlns:asvg="http://schemas.microsoft.com/office/drawing/2016/SVG/main" r:embed="rId24"/>
+                </a:ext>
+              </a:extLst>
+            </a:blip>
+            <a:stretch>
+              <a:fillRect/>
+            </a:stretch>
+          </a:blipFill>
+          <a:ln cap="sq">
+            <a:noFill/>
+            <a:prstDash val="solid"/>
+            <a:miter/>
+          </a:ln>
+        </p:spPr>
+        <p:txBody>
+          <a:bodyPr/>
+          <a:lstStyle/>
+          <a:p>
+            <a:endParaRPr lang="en-DE" sz="1200"/>
+          </a:p>
+        </p:txBody>
+      </p:sp>
+      <p:sp>
+        <p:nvSpPr>
+          <p:cNvPr id="17" name="Freeform 17"/>
+          <p:cNvSpPr/>
+          <p:nvPr/>
+        </p:nvSpPr>
+        <p:spPr>
+          <a:xfrm rot="-5282649">
+            <a:off x="11064338" y="4647246"/>
+            <a:ext cx="2255325" cy="769629"/>
+          </a:xfrm>
+          <a:custGeom>
+            <a:avLst/>
+            <a:gdLst/>
+            <a:ahLst/>
+            <a:cxnLst/>
+            <a:rect l="l" t="t" r="r" b="b"/>
+            <a:pathLst>
+              <a:path w="3382987" h="1154444">
+                <a:moveTo>
+                  <a:pt x="0" y="0"/>
+                </a:moveTo>
+                <a:lnTo>
+                  <a:pt x="3382988" y="0"/>
+                </a:lnTo>
+                <a:lnTo>
+                  <a:pt x="3382988" y="1154445"/>
+                </a:lnTo>
+                <a:lnTo>
+                  <a:pt x="0" y="1154445"/>
+                </a:lnTo>
+                <a:lnTo>
+                  <a:pt x="0" y="0"/>
+                </a:lnTo>
+                <a:close/>
+              </a:path>
+            </a:pathLst>
+          </a:custGeom>
+          <a:blipFill>
+            <a:blip r:embed="rId25">
+              <a:extLst>
+                <a:ext uri="{96DAC541-7B7A-43D3-8B79-37D633B846F1}">
+                  <asvg:svgBlip xmlns:asvg="http://schemas.microsoft.com/office/drawing/2016/SVG/main" r:embed="rId26"/>
+                </a:ext>
+              </a:extLst>
+            </a:blip>
+            <a:stretch>
+              <a:fillRect/>
+            </a:stretch>
+          </a:blipFill>
+          <a:ln cap="sq">
+            <a:noFill/>
+            <a:prstDash val="solid"/>
+            <a:miter/>
+          </a:ln>
+        </p:spPr>
+        <p:txBody>
+          <a:bodyPr/>
+          <a:lstStyle/>
+          <a:p>
+            <a:endParaRPr lang="en-DE" sz="1200"/>
+          </a:p>
+        </p:txBody>
+      </p:sp>
+      <p:sp>
+        <p:nvSpPr>
+          <p:cNvPr id="18" name="Freeform 18"/>
+          <p:cNvSpPr/>
+          <p:nvPr/>
+        </p:nvSpPr>
+        <p:spPr>
+          <a:xfrm>
+            <a:off x="11506200" y="-647773"/>
+            <a:ext cx="2069681" cy="2228459"/>
+          </a:xfrm>
+          <a:custGeom>
+            <a:avLst/>
+            <a:gdLst/>
+            <a:ahLst/>
+            <a:cxnLst/>
+            <a:rect l="l" t="t" r="r" b="b"/>
+            <a:pathLst>
+              <a:path w="3104522" h="3342688">
+                <a:moveTo>
+                  <a:pt x="0" y="0"/>
+                </a:moveTo>
+                <a:lnTo>
+                  <a:pt x="3104522" y="0"/>
+                </a:lnTo>
+                <a:lnTo>
+                  <a:pt x="3104522" y="3342689"/>
+                </a:lnTo>
+                <a:lnTo>
+                  <a:pt x="0" y="3342689"/>
+                </a:lnTo>
+                <a:lnTo>
+                  <a:pt x="0" y="0"/>
+                </a:lnTo>
+                <a:close/>
+              </a:path>
+            </a:pathLst>
+          </a:custGeom>
+          <a:blipFill>
+            <a:blip r:embed="rId27">
+              <a:extLst>
+                <a:ext uri="{96DAC541-7B7A-43D3-8B79-37D633B846F1}">
+                  <asvg:svgBlip xmlns:asvg="http://schemas.microsoft.com/office/drawing/2016/SVG/main" r:embed="rId28"/>
+                </a:ext>
+              </a:extLst>
+            </a:blip>
+            <a:stretch>
+              <a:fillRect/>
+            </a:stretch>
+          </a:blipFill>
+          <a:ln cap="sq">
+            <a:noFill/>
+            <a:prstDash val="solid"/>
+            <a:miter/>
+          </a:ln>
+        </p:spPr>
+        <p:txBody>
+          <a:bodyPr/>
+          <a:lstStyle/>
+          <a:p>
+            <a:endParaRPr lang="en-DE" sz="1200"/>
+          </a:p>
+        </p:txBody>
+      </p:sp>
+    </p:spTree>
+  </p:cSld>
+  <p:clrMapOvr>
+    <a:masterClrMapping/>
+  </p:clrMapOvr>
+</p:sld>
+</file>
+
+<file path=ppt/slides/slide19.xml><?xml version="1.0" encoding="utf-8"?>
+<p:sld xmlns:a="http://schemas.openxmlformats.org/drawingml/2006/main" xmlns:r="http://schemas.openxmlformats.org/officeDocument/2006/relationships" xmlns:p="http://schemas.openxmlformats.org/presentationml/2006/main">
+  <p:cSld>
+    <p:spTree>
+      <p:nvGrpSpPr>
+        <p:cNvPr id="1" name=""/>
+        <p:cNvGrpSpPr/>
+        <p:nvPr/>
+      </p:nvGrpSpPr>
+      <p:grpSpPr>
+        <a:xfrm>
+          <a:off x="0" y="0"/>
+          <a:ext cx="0" cy="0"/>
+          <a:chOff x="0" y="0"/>
+          <a:chExt cx="0" cy="0"/>
+        </a:xfrm>
+      </p:grpSpPr>
+      <p:sp>
+        <p:nvSpPr>
+          <p:cNvPr id="2" name="Freeform 2"/>
+          <p:cNvSpPr/>
+          <p:nvPr/>
+        </p:nvSpPr>
+        <p:spPr>
+          <a:xfrm rot="-5400000">
+            <a:off x="2667000" y="-2667000"/>
+            <a:ext cx="6858000" cy="12192000"/>
+          </a:xfrm>
+          <a:custGeom>
+            <a:avLst/>
+            <a:gdLst/>
+            <a:ahLst/>
+            <a:cxnLst/>
+            <a:rect l="l" t="t" r="r" b="b"/>
+            <a:pathLst>
+              <a:path w="10287000" h="18288000">
+                <a:moveTo>
+                  <a:pt x="10287000" y="0"/>
+                </a:moveTo>
+                <a:lnTo>
+                  <a:pt x="10287000" y="18288000"/>
+                </a:lnTo>
+                <a:lnTo>
+                  <a:pt x="0" y="18288000"/>
+                </a:lnTo>
+                <a:lnTo>
+                  <a:pt x="0" y="0"/>
+                </a:lnTo>
+                <a:lnTo>
+                  <a:pt x="10287000" y="0"/>
+                </a:lnTo>
+                <a:close/>
+              </a:path>
+            </a:pathLst>
+          </a:custGeom>
+          <a:blipFill>
+            <a:blip r:embed="rId2">
+              <a:alphaModFix amt="55000"/>
+            </a:blip>
+            <a:stretch>
+              <a:fillRect l="-71867" t="-3631" r="-74156" b="-2747"/>
+            </a:stretch>
+          </a:blipFill>
+        </p:spPr>
+        <p:txBody>
+          <a:bodyPr/>
+          <a:lstStyle/>
+          <a:p>
+            <a:endParaRPr lang="en-DE" sz="1200"/>
+          </a:p>
+        </p:txBody>
+      </p:sp>
+      <p:sp>
+        <p:nvSpPr>
+          <p:cNvPr id="3" name="Freeform 3"/>
+          <p:cNvSpPr/>
+          <p:nvPr/>
+        </p:nvSpPr>
+        <p:spPr>
+          <a:xfrm>
+            <a:off x="7213272" y="1300304"/>
+            <a:ext cx="2805715" cy="2831456"/>
+          </a:xfrm>
+          <a:custGeom>
+            <a:avLst/>
+            <a:gdLst/>
+            <a:ahLst/>
+            <a:cxnLst/>
+            <a:rect l="l" t="t" r="r" b="b"/>
+            <a:pathLst>
+              <a:path w="4208573" h="4247184">
+                <a:moveTo>
+                  <a:pt x="0" y="0"/>
+                </a:moveTo>
+                <a:lnTo>
+                  <a:pt x="4208573" y="0"/>
+                </a:lnTo>
+                <a:lnTo>
+                  <a:pt x="4208573" y="4247184"/>
+                </a:lnTo>
+                <a:lnTo>
+                  <a:pt x="0" y="4247184"/>
+                </a:lnTo>
+                <a:lnTo>
+                  <a:pt x="0" y="0"/>
+                </a:lnTo>
+                <a:close/>
+              </a:path>
+            </a:pathLst>
+          </a:custGeom>
+          <a:blipFill>
+            <a:blip r:embed="rId3">
+              <a:extLst>
+                <a:ext uri="{96DAC541-7B7A-43D3-8B79-37D633B846F1}">
+                  <asvg:svgBlip xmlns:asvg="http://schemas.microsoft.com/office/drawing/2016/SVG/main" r:embed="rId4"/>
+                </a:ext>
+              </a:extLst>
+            </a:blip>
+            <a:stretch>
+              <a:fillRect/>
+            </a:stretch>
+          </a:blipFill>
+          <a:ln cap="sq">
+            <a:noFill/>
+            <a:prstDash val="solid"/>
+            <a:miter/>
+          </a:ln>
+        </p:spPr>
+        <p:txBody>
+          <a:bodyPr/>
+          <a:lstStyle/>
+          <a:p>
+            <a:endParaRPr lang="en-DE" sz="1200"/>
+          </a:p>
+        </p:txBody>
+      </p:sp>
+      <p:sp>
+        <p:nvSpPr>
+          <p:cNvPr id="4" name="Freeform 4"/>
+          <p:cNvSpPr/>
+          <p:nvPr/>
+        </p:nvSpPr>
+        <p:spPr>
+          <a:xfrm>
+            <a:off x="6837411" y="1759366"/>
+            <a:ext cx="4787483" cy="3339269"/>
+          </a:xfrm>
+          <a:custGeom>
+            <a:avLst/>
+            <a:gdLst/>
+            <a:ahLst/>
+            <a:cxnLst/>
+            <a:rect l="l" t="t" r="r" b="b"/>
+            <a:pathLst>
+              <a:path w="7181225" h="5008904">
+                <a:moveTo>
+                  <a:pt x="0" y="0"/>
+                </a:moveTo>
+                <a:lnTo>
+                  <a:pt x="7181225" y="0"/>
+                </a:lnTo>
+                <a:lnTo>
+                  <a:pt x="7181225" y="5008904"/>
+                </a:lnTo>
+                <a:lnTo>
+                  <a:pt x="0" y="5008904"/>
+                </a:lnTo>
+                <a:lnTo>
+                  <a:pt x="0" y="0"/>
+                </a:lnTo>
+                <a:close/>
+              </a:path>
+            </a:pathLst>
+          </a:custGeom>
+          <a:blipFill>
+            <a:blip r:embed="rId5">
+              <a:extLst>
+                <a:ext uri="{96DAC541-7B7A-43D3-8B79-37D633B846F1}">
+                  <asvg:svgBlip xmlns:asvg="http://schemas.microsoft.com/office/drawing/2016/SVG/main" r:embed="rId6"/>
+                </a:ext>
+              </a:extLst>
+            </a:blip>
+            <a:stretch>
+              <a:fillRect/>
+            </a:stretch>
+          </a:blipFill>
+        </p:spPr>
+        <p:txBody>
+          <a:bodyPr/>
+          <a:lstStyle/>
+          <a:p>
+            <a:endParaRPr lang="en-DE" sz="1200"/>
+          </a:p>
+        </p:txBody>
+      </p:sp>
+      <p:sp>
+        <p:nvSpPr>
+          <p:cNvPr id="5" name="TextBox 5"/>
+          <p:cNvSpPr txBox="1"/>
+          <p:nvPr/>
+        </p:nvSpPr>
+        <p:spPr>
+          <a:xfrm>
+            <a:off x="1003300" y="1169670"/>
+            <a:ext cx="5834110" cy="1504771"/>
+          </a:xfrm>
+          <a:prstGeom prst="rect">
+            <a:avLst/>
+          </a:prstGeom>
+        </p:spPr>
+        <p:txBody>
+          <a:bodyPr lIns="0" tIns="0" rIns="0" bIns="0" rtlCol="0" anchor="t">
+            <a:spAutoFit/>
+          </a:bodyPr>
+          <a:lstStyle/>
+          <a:p>
+            <a:pPr>
+              <a:lnSpc>
+                <a:spcPts val="5820"/>
+              </a:lnSpc>
+            </a:pPr>
+            <a:r>
+              <a:rPr lang="en-US" sz="6000">
+                <a:solidFill>
+                  <a:srgbClr val="000000"/>
+                </a:solidFill>
+                <a:latin typeface="DM Sans Bold"/>
+              </a:rPr>
+              <a:t>Final reflections and future steps</a:t>
+            </a:r>
+          </a:p>
+        </p:txBody>
+      </p:sp>
+      <p:sp>
+        <p:nvSpPr>
+          <p:cNvPr id="6" name="TextBox 6"/>
+          <p:cNvSpPr txBox="1"/>
+          <p:nvPr/>
+        </p:nvSpPr>
+        <p:spPr>
+          <a:xfrm>
+            <a:off x="1003300" y="3599180"/>
+            <a:ext cx="5138381" cy="2299412"/>
+          </a:xfrm>
+          <a:prstGeom prst="rect">
+            <a:avLst/>
+          </a:prstGeom>
+        </p:spPr>
+        <p:txBody>
+          <a:bodyPr lIns="0" tIns="0" rIns="0" bIns="0" rtlCol="0" anchor="t">
+            <a:spAutoFit/>
+          </a:bodyPr>
+          <a:lstStyle/>
+          <a:p>
+            <a:pPr>
+              <a:lnSpc>
+                <a:spcPts val="1799"/>
+              </a:lnSpc>
+              <a:spcBef>
+                <a:spcPct val="0"/>
+              </a:spcBef>
+            </a:pPr>
+            <a:r>
+              <a:rPr lang="en-US" sz="1333" spc="79">
+                <a:solidFill>
+                  <a:srgbClr val="000000"/>
+                </a:solidFill>
+                <a:latin typeface="DM Sans"/>
+              </a:rPr>
+              <a:t>Lorem ipsum dolor sit amet, consectetur adipiscing elit, sed do eiusmod tempor incididunt ut labore et dolore magna aliqua. Ut enim ad minim veniam, quis nostrud exercitation ullamco laboris nisi ut aliquip ex ea commodo consequat.</a:t>
+            </a:r>
+          </a:p>
+          <a:p>
+            <a:pPr>
+              <a:lnSpc>
+                <a:spcPts val="1799"/>
+              </a:lnSpc>
+              <a:spcBef>
+                <a:spcPct val="0"/>
+              </a:spcBef>
+            </a:pPr>
+            <a:endParaRPr lang="en-US" sz="1333" spc="79">
+              <a:solidFill>
+                <a:srgbClr val="000000"/>
+              </a:solidFill>
+              <a:latin typeface="DM Sans"/>
+            </a:endParaRPr>
+          </a:p>
+          <a:p>
+            <a:pPr>
+              <a:lnSpc>
+                <a:spcPts val="1799"/>
+              </a:lnSpc>
+              <a:spcBef>
+                <a:spcPct val="0"/>
+              </a:spcBef>
+            </a:pPr>
+            <a:r>
+              <a:rPr lang="en-US" sz="1333" spc="79">
+                <a:solidFill>
+                  <a:srgbClr val="000000"/>
+                </a:solidFill>
+                <a:latin typeface="DM Sans"/>
+              </a:rPr>
+              <a:t>Duis aute irure dolor in reprehenderit in voluptate velit esse cillum dolore eu fugiat nulla pariatur. Excepteur sint occaecat cupidatat non proident, sunt in culpa qui officia deserunt mollit anim id est laborum.</a:t>
+            </a:r>
+          </a:p>
+        </p:txBody>
+      </p:sp>
+    </p:spTree>
+  </p:cSld>
+  <p:clrMapOvr>
+    <a:masterClrMapping/>
+  </p:clrMapOvr>
+</p:sld>
+</file>
+
 <file path=ppt/slides/slide2.xml><?xml version="1.0" encoding="utf-8"?>
 <p:sld xmlns:a="http://schemas.openxmlformats.org/drawingml/2006/main" xmlns:r="http://schemas.openxmlformats.org/officeDocument/2006/relationships" xmlns:p="http://schemas.openxmlformats.org/presentationml/2006/main">
   <p:cSld>
@@ -6830,7 +8521,7 @@
         </p:nvGraphicFramePr>
         <p:xfrm>
           <a:off x="1765610" y="1254512"/>
-          <a:ext cx="9198779" cy="4759022"/>
+          <a:ext cx="9198779" cy="4759918"/>
         </p:xfrm>
         <a:graphic>
           <a:graphicData uri="http://schemas.openxmlformats.org/drawingml/2006/table">

</xml_diff>